<commit_message>
new movement of Player
</commit_message>
<xml_diff>
--- a/files/Powerpoint_CrazyApe.pptx
+++ b/files/Powerpoint_CrazyApe.pptx
@@ -987,6 +987,115 @@
               </a:spcAft>
               <a:buNone/>
             </a:pPr>
+            <a:endParaRPr/>
+          </a:p>
+        </p:txBody>
+      </p:sp>
+    </p:spTree>
+    <p:extLst>
+      <p:ext uri="{BB962C8B-B14F-4D97-AF65-F5344CB8AC3E}">
+        <p14:creationId xmlns:p14="http://schemas.microsoft.com/office/powerpoint/2010/main" val="3120409949"/>
+      </p:ext>
+    </p:extLst>
+  </p:cSld>
+  <p:clrMapOvr>
+    <a:masterClrMapping/>
+  </p:clrMapOvr>
+</p:notes>
+</file>
+
+<file path=ppt/notesSlides/notesSlide11.xml><?xml version="1.0" encoding="utf-8"?>
+<p:notes xmlns:a="http://schemas.openxmlformats.org/drawingml/2006/main" xmlns:r="http://schemas.openxmlformats.org/officeDocument/2006/relationships" xmlns:p="http://schemas.openxmlformats.org/presentationml/2006/main" showMasterSp="0" showMasterPhAnim="0">
+  <p:cSld>
+    <p:spTree>
+      <p:nvGrpSpPr>
+        <p:cNvPr id="1" name="Shape 496"/>
+        <p:cNvGrpSpPr/>
+        <p:nvPr/>
+      </p:nvGrpSpPr>
+      <p:grpSpPr>
+        <a:xfrm>
+          <a:off x="0" y="0"/>
+          <a:ext cx="0" cy="0"/>
+          <a:chOff x="0" y="0"/>
+          <a:chExt cx="0" cy="0"/>
+        </a:xfrm>
+      </p:grpSpPr>
+      <p:sp>
+        <p:nvSpPr>
+          <p:cNvPr id="497" name="Google Shape;497;ge7f9c668d6_0_6:notes"/>
+          <p:cNvSpPr>
+            <a:spLocks noGrp="1" noRot="1" noChangeAspect="1"/>
+          </p:cNvSpPr>
+          <p:nvPr>
+            <p:ph type="sldImg" idx="2"/>
+          </p:nvPr>
+        </p:nvSpPr>
+        <p:spPr>
+          <a:xfrm>
+            <a:off x="381000" y="685800"/>
+            <a:ext cx="6096000" cy="3429000"/>
+          </a:xfrm>
+          <a:custGeom>
+            <a:avLst/>
+            <a:gdLst/>
+            <a:ahLst/>
+            <a:cxnLst/>
+            <a:rect l="l" t="t" r="r" b="b"/>
+            <a:pathLst>
+              <a:path w="120000" h="120000" extrusionOk="0">
+                <a:moveTo>
+                  <a:pt x="0" y="0"/>
+                </a:moveTo>
+                <a:lnTo>
+                  <a:pt x="120000" y="0"/>
+                </a:lnTo>
+                <a:lnTo>
+                  <a:pt x="120000" y="120000"/>
+                </a:lnTo>
+                <a:lnTo>
+                  <a:pt x="0" y="120000"/>
+                </a:lnTo>
+                <a:close/>
+              </a:path>
+            </a:pathLst>
+          </a:custGeom>
+        </p:spPr>
+      </p:sp>
+      <p:sp>
+        <p:nvSpPr>
+          <p:cNvPr id="498" name="Google Shape;498;ge7f9c668d6_0_6:notes"/>
+          <p:cNvSpPr txBox="1">
+            <a:spLocks noGrp="1"/>
+          </p:cNvSpPr>
+          <p:nvPr>
+            <p:ph type="body" idx="1"/>
+          </p:nvPr>
+        </p:nvSpPr>
+        <p:spPr>
+          <a:xfrm>
+            <a:off x="685800" y="4343400"/>
+            <a:ext cx="5486400" cy="4114800"/>
+          </a:xfrm>
+          <a:prstGeom prst="rect">
+            <a:avLst/>
+          </a:prstGeom>
+        </p:spPr>
+        <p:txBody>
+          <a:bodyPr spcFirstLastPara="1" wrap="square" lIns="91425" tIns="91425" rIns="91425" bIns="91425" anchor="t" anchorCtr="0">
+            <a:noAutofit/>
+          </a:bodyPr>
+          <a:lstStyle/>
+          <a:p>
+            <a:pPr marL="0" lvl="0" indent="0" algn="l" rtl="0">
+              <a:spcBef>
+                <a:spcPts val="0"/>
+              </a:spcBef>
+              <a:spcAft>
+                <a:spcPts val="0"/>
+              </a:spcAft>
+              <a:buNone/>
+            </a:pPr>
             <a:r>
               <a:rPr lang="de-DE" dirty="0"/>
               <a:t>Verbesserungen im Code &amp; auch in der Art wie wir zusammen </a:t>
@@ -1219,7 +1328,7 @@
 </p:notes>
 </file>
 
-<file path=ppt/notesSlides/notesSlide11.xml><?xml version="1.0" encoding="utf-8"?>
+<file path=ppt/notesSlides/notesSlide12.xml><?xml version="1.0" encoding="utf-8"?>
 <p:notes xmlns:a="http://schemas.openxmlformats.org/drawingml/2006/main" xmlns:r="http://schemas.openxmlformats.org/officeDocument/2006/relationships" xmlns:p="http://schemas.openxmlformats.org/presentationml/2006/main" showMasterSp="0" showMasterPhAnim="0">
   <p:cSld>
     <p:spTree>
@@ -2516,11 +2625,11 @@
 </file>
 
 <file path=ppt/notesSlides/notesSlide9.xml><?xml version="1.0" encoding="utf-8"?>
-<p:notes xmlns:a="http://schemas.openxmlformats.org/drawingml/2006/main" xmlns:r="http://schemas.openxmlformats.org/officeDocument/2006/relationships" xmlns:p="http://schemas.openxmlformats.org/presentationml/2006/main" showMasterSp="0" showMasterPhAnim="0">
+<p:notes xmlns:a="http://schemas.openxmlformats.org/drawingml/2006/main" xmlns:r="http://schemas.openxmlformats.org/officeDocument/2006/relationships" xmlns:p="http://schemas.openxmlformats.org/presentationml/2006/main">
   <p:cSld>
     <p:spTree>
       <p:nvGrpSpPr>
-        <p:cNvPr id="1" name="Shape 496"/>
+        <p:cNvPr id="1" name=""/>
         <p:cNvGrpSpPr/>
         <p:nvPr/>
       </p:nvGrpSpPr>
@@ -2534,87 +2643,39 @@
       </p:grpSpPr>
       <p:sp>
         <p:nvSpPr>
-          <p:cNvPr id="497" name="Google Shape;497;ge7f9c668d6_0_6:notes"/>
+          <p:cNvPr id="2" name="Folienbildplatzhalter 1"/>
           <p:cNvSpPr>
             <a:spLocks noGrp="1" noRot="1" noChangeAspect="1"/>
           </p:cNvSpPr>
           <p:nvPr>
-            <p:ph type="sldImg" idx="2"/>
+            <p:ph type="sldImg"/>
           </p:nvPr>
         </p:nvSpPr>
-        <p:spPr>
-          <a:xfrm>
-            <a:off x="381000" y="685800"/>
-            <a:ext cx="6096000" cy="3429000"/>
-          </a:xfrm>
-          <a:custGeom>
-            <a:avLst/>
-            <a:gdLst/>
-            <a:ahLst/>
-            <a:cxnLst/>
-            <a:rect l="l" t="t" r="r" b="b"/>
-            <a:pathLst>
-              <a:path w="120000" h="120000" extrusionOk="0">
-                <a:moveTo>
-                  <a:pt x="0" y="0"/>
-                </a:moveTo>
-                <a:lnTo>
-                  <a:pt x="120000" y="0"/>
-                </a:lnTo>
-                <a:lnTo>
-                  <a:pt x="120000" y="120000"/>
-                </a:lnTo>
-                <a:lnTo>
-                  <a:pt x="0" y="120000"/>
-                </a:lnTo>
-                <a:close/>
-              </a:path>
-            </a:pathLst>
-          </a:custGeom>
-        </p:spPr>
-      </p:sp>
-      <p:sp>
-        <p:nvSpPr>
-          <p:cNvPr id="498" name="Google Shape;498;ge7f9c668d6_0_6:notes"/>
-          <p:cNvSpPr txBox="1">
+        <p:spPr/>
+      </p:sp>
+      <p:sp>
+        <p:nvSpPr>
+          <p:cNvPr id="3" name="Notizenplatzhalter 2"/>
+          <p:cNvSpPr>
             <a:spLocks noGrp="1"/>
           </p:cNvSpPr>
           <p:nvPr>
             <p:ph type="body" idx="1"/>
           </p:nvPr>
         </p:nvSpPr>
-        <p:spPr>
-          <a:xfrm>
-            <a:off x="685800" y="4343400"/>
-            <a:ext cx="5486400" cy="4114800"/>
-          </a:xfrm>
-          <a:prstGeom prst="rect">
-            <a:avLst/>
-          </a:prstGeom>
-        </p:spPr>
-        <p:txBody>
-          <a:bodyPr spcFirstLastPara="1" wrap="square" lIns="91425" tIns="91425" rIns="91425" bIns="91425" anchor="t" anchorCtr="0">
-            <a:noAutofit/>
-          </a:bodyPr>
+        <p:spPr/>
+        <p:txBody>
+          <a:bodyPr/>
           <a:lstStyle/>
           <a:p>
-            <a:pPr marL="0" lvl="0" indent="0" algn="l" rtl="0">
-              <a:spcBef>
-                <a:spcPts val="0"/>
-              </a:spcBef>
-              <a:spcAft>
-                <a:spcPts val="0"/>
-              </a:spcAft>
-              <a:buNone/>
-            </a:pPr>
-            <a:endParaRPr/>
+            <a:endParaRPr lang="de-DE" dirty="0"/>
           </a:p>
         </p:txBody>
       </p:sp>
     </p:spTree>
     <p:extLst>
       <p:ext uri="{BB962C8B-B14F-4D97-AF65-F5344CB8AC3E}">
-        <p14:creationId xmlns:p14="http://schemas.microsoft.com/office/powerpoint/2010/main" val="3120409949"/>
+        <p14:creationId xmlns:p14="http://schemas.microsoft.com/office/powerpoint/2010/main" val="3953670965"/>
       </p:ext>
     </p:extLst>
   </p:cSld>
@@ -17829,10 +17890,10 @@
       </p:grpSpPr>
       <p:pic>
         <p:nvPicPr>
-          <p:cNvPr id="6" name="Grafik 5">
+          <p:cNvPr id="3" name="Grafik 2">
             <a:extLst>
               <a:ext uri="{FF2B5EF4-FFF2-40B4-BE49-F238E27FC236}">
-                <a16:creationId xmlns:a16="http://schemas.microsoft.com/office/drawing/2014/main" id="{1BDCBFBB-1051-4507-24AB-6079F937E547}"/>
+                <a16:creationId xmlns:a16="http://schemas.microsoft.com/office/drawing/2014/main" id="{031295A2-4735-DB39-6F90-B7A95A4406A8}"/>
               </a:ext>
             </a:extLst>
           </p:cNvPr>
@@ -17842,15 +17903,15 @@
           <p:nvPr/>
         </p:nvPicPr>
         <p:blipFill>
-          <a:blip r:embed="rId2"/>
+          <a:blip r:embed="rId3"/>
           <a:stretch>
             <a:fillRect/>
           </a:stretch>
         </p:blipFill>
         <p:spPr>
           <a:xfrm>
-            <a:off x="1058400" y="153489"/>
-            <a:ext cx="7641835" cy="4836521"/>
+            <a:off x="1046190" y="127030"/>
+            <a:ext cx="7807877" cy="4889440"/>
           </a:xfrm>
           <a:prstGeom prst="rect">
             <a:avLst/>

</xml_diff>